<commit_message>
Actualización de user stories y casos de uso.
</commit_message>
<xml_diff>
--- a/Historias-CasosDeUso.pptx
+++ b/Historias-CasosDeUso.pptx
@@ -469,7 +469,7 @@
             <a:pPr rtl="0"/>
             <a:fld id="{57074005-F269-45F9-A4A0-133657C22EC9}" type="datetime1">
               <a:rPr lang="es-ES" smtClean="0"/>
-              <a:t>01/09/2021</a:t>
+              <a:t>05/09/2021</a:t>
             </a:fld>
             <a:endParaRPr lang="es-ES"/>
           </a:p>
@@ -651,7 +651,7 @@
             <a:pPr rtl="0"/>
             <a:fld id="{E04E4763-8A9C-48F9-B081-3BFC6839A78E}" type="datetime1">
               <a:rPr lang="es-ES" noProof="0" smtClean="0"/>
-              <a:t>01/09/2021</a:t>
+              <a:t>05/09/2021</a:t>
             </a:fld>
             <a:endParaRPr lang="es-ES" noProof="0"/>
           </a:p>
@@ -3587,7 +3587,7 @@
             <a:pPr rtl="0"/>
             <a:fld id="{2D33924A-CFCB-4625-8D3A-7898DE507833}" type="datetime1">
               <a:rPr lang="es-ES" noProof="0" smtClean="0"/>
-              <a:t>01/09/2021</a:t>
+              <a:t>05/09/2021</a:t>
             </a:fld>
             <a:endParaRPr lang="es-ES" noProof="0"/>
           </a:p>
@@ -4150,7 +4150,7 @@
             <a:pPr rtl="0"/>
             <a:fld id="{DCADA9E9-C924-4FC4-B86A-FD08B8390FFC}" type="datetime1">
               <a:rPr lang="es-ES" noProof="0" smtClean="0"/>
-              <a:t>01/09/2021</a:t>
+              <a:t>05/09/2021</a:t>
             </a:fld>
             <a:endParaRPr lang="es-ES" noProof="0"/>
           </a:p>
@@ -4713,7 +4713,7 @@
             <a:pPr rtl="0"/>
             <a:fld id="{A49C59D4-3CFC-4B0B-A379-52D074AFEA05}" type="datetime1">
               <a:rPr lang="es-ES" noProof="0" smtClean="0"/>
-              <a:t>01/09/2021</a:t>
+              <a:t>05/09/2021</a:t>
             </a:fld>
             <a:endParaRPr lang="es-ES" noProof="0"/>
           </a:p>
@@ -5276,7 +5276,7 @@
             <a:pPr rtl="0"/>
             <a:fld id="{A29CA075-8509-4153-927C-05E4F9889C7C}" type="datetime1">
               <a:rPr lang="es-ES" noProof="0" smtClean="0"/>
-              <a:t>01/09/2021</a:t>
+              <a:t>05/09/2021</a:t>
             </a:fld>
             <a:endParaRPr lang="es-ES" noProof="0"/>
           </a:p>
@@ -5800,7 +5800,7 @@
                   </a:schemeClr>
                 </a:solidFill>
               </a:rPr>
-              <a:t>Dar de altas Libros para que mis clientes puedan ver la información completa y elegir.</a:t>
+              <a:t>Dar de altas Libros para que los lectores puedan ver la información completa y elegir.</a:t>
             </a:r>
           </a:p>
           <a:p>
@@ -5817,7 +5817,7 @@
                   </a:schemeClr>
                 </a:solidFill>
               </a:rPr>
-              <a:t>Dar de baja Libros para que el sistema muestre únicamente información actualizada del mercado.</a:t>
+              <a:t>Dar de baja Libros para que el sistema muestre únicamente libros disponibles para interactuar.</a:t>
             </a:r>
           </a:p>
           <a:p>
@@ -5834,7 +5834,7 @@
                   </a:schemeClr>
                 </a:solidFill>
               </a:rPr>
-              <a:t>Modificar los datos de los Libros para que los clientes encuentren precios y datos correctos.</a:t>
+              <a:t>Modificar los datos de los Libros para que los lectores encuentren los datos actualizados.</a:t>
             </a:r>
           </a:p>
           <a:p>
@@ -5868,7 +5868,7 @@
                   </a:schemeClr>
                 </a:solidFill>
               </a:rPr>
-              <a:t>Agregar una imagen de los Libros y de esta forma los clientes puedan observar sus características físicas y tener una idea clara de lo que pueden comprar.</a:t>
+              <a:t>Agregar una imagen de los Libros y de esta forma los clientes puedan observar sus características físicas y tener una idea clara de como es.</a:t>
             </a:r>
           </a:p>
           <a:p>
@@ -5932,7 +5932,7 @@
                   </a:schemeClr>
                 </a:solidFill>
               </a:rPr>
-              <a:t>Poder elegir uno o más Libros para realizar una compra.</a:t>
+              <a:t>Poder elegir uno o más Libros para realizar un comentario.</a:t>
             </a:r>
           </a:p>
           <a:p>
@@ -5949,7 +5949,7 @@
                   </a:schemeClr>
                 </a:solidFill>
               </a:rPr>
-              <a:t>Poder cancelar una compra.</a:t>
+              <a:t>Poder cancelar un comentario.</a:t>
             </a:r>
           </a:p>
           <a:p>
@@ -5966,7 +5966,7 @@
                   </a:schemeClr>
                 </a:solidFill>
               </a:rPr>
-              <a:t>Modificar una compra.</a:t>
+              <a:t>Modificar un comentario.</a:t>
             </a:r>
           </a:p>
           <a:p>
@@ -6090,7 +6090,7 @@
         </p:nvPicPr>
         <p:blipFill rotWithShape="1">
           <a:blip r:embed="rId3"/>
-          <a:srcRect l="51587" t="-4077" r="-4343" b="-1992"/>
+          <a:srcRect l="54946" r="-4684"/>
           <a:stretch/>
         </p:blipFill>
         <p:spPr>
@@ -7544,12 +7544,12 @@
 </file>
 
 <file path=customXml/item1.xml><?xml version="1.0" encoding="utf-8"?>
-<p:properties xmlns:p="http://schemas.microsoft.com/office/2006/metadata/properties" xmlns:xsi="http://www.w3.org/2001/XMLSchema-instance" xmlns:pc="http://schemas.microsoft.com/office/infopath/2007/PartnerControls">
-  <documentManagement>
-    <Status xmlns="71af3243-3dd4-4a8d-8c0d-dd76da1f02a5">Not started</Status>
-    <MediaServiceKeyPoints xmlns="71af3243-3dd4-4a8d-8c0d-dd76da1f02a5" xsi:nil="true"/>
-  </documentManagement>
-</p:properties>
+<?mso-contentType ?>
+<FormTemplates xmlns="http://schemas.microsoft.com/sharepoint/v3/contenttype/forms">
+  <Display>DocumentLibraryForm</Display>
+  <Edit>DocumentLibraryForm</Edit>
+  <New>DocumentLibraryForm</New>
+</FormTemplates>
 </file>
 
 <file path=customXml/item2.xml><?xml version="1.0" encoding="utf-8"?>
@@ -7774,20 +7774,18 @@
 </file>
 
 <file path=customXml/item3.xml><?xml version="1.0" encoding="utf-8"?>
-<?mso-contentType ?>
-<FormTemplates xmlns="http://schemas.microsoft.com/sharepoint/v3/contenttype/forms">
-  <Display>DocumentLibraryForm</Display>
-  <Edit>DocumentLibraryForm</Edit>
-  <New>DocumentLibraryForm</New>
-</FormTemplates>
+<p:properties xmlns:p="http://schemas.microsoft.com/office/2006/metadata/properties" xmlns:xsi="http://www.w3.org/2001/XMLSchema-instance" xmlns:pc="http://schemas.microsoft.com/office/infopath/2007/PartnerControls">
+  <documentManagement>
+    <Status xmlns="71af3243-3dd4-4a8d-8c0d-dd76da1f02a5">Not started</Status>
+    <MediaServiceKeyPoints xmlns="71af3243-3dd4-4a8d-8c0d-dd76da1f02a5" xsi:nil="true"/>
+  </documentManagement>
+</p:properties>
 </file>
 
 <file path=customXml/itemProps1.xml><?xml version="1.0" encoding="utf-8"?>
-<ds:datastoreItem xmlns:ds="http://schemas.openxmlformats.org/officeDocument/2006/customXml" ds:itemID="{D7B26A4C-9D53-419A-BF3D-DD9A269B737B}">
+<ds:datastoreItem xmlns:ds="http://schemas.openxmlformats.org/officeDocument/2006/customXml" ds:itemID="{F8A3F712-F9CB-434B-AE12-0D3A70CC762D}">
   <ds:schemaRefs>
-    <ds:schemaRef ds:uri="http://schemas.microsoft.com/office/2006/metadata/properties"/>
-    <ds:schemaRef ds:uri="http://schemas.microsoft.com/office/infopath/2007/PartnerControls"/>
-    <ds:schemaRef ds:uri="71af3243-3dd4-4a8d-8c0d-dd76da1f02a5"/>
+    <ds:schemaRef ds:uri="http://schemas.microsoft.com/sharepoint/v3/contenttype/forms"/>
   </ds:schemaRefs>
 </ds:datastoreItem>
 </file>
@@ -7812,9 +7810,11 @@
 </file>
 
 <file path=customXml/itemProps3.xml><?xml version="1.0" encoding="utf-8"?>
-<ds:datastoreItem xmlns:ds="http://schemas.openxmlformats.org/officeDocument/2006/customXml" ds:itemID="{F8A3F712-F9CB-434B-AE12-0D3A70CC762D}">
+<ds:datastoreItem xmlns:ds="http://schemas.openxmlformats.org/officeDocument/2006/customXml" ds:itemID="{D7B26A4C-9D53-419A-BF3D-DD9A269B737B}">
   <ds:schemaRefs>
-    <ds:schemaRef ds:uri="http://schemas.microsoft.com/sharepoint/v3/contenttype/forms"/>
+    <ds:schemaRef ds:uri="http://schemas.microsoft.com/office/2006/metadata/properties"/>
+    <ds:schemaRef ds:uri="http://schemas.microsoft.com/office/infopath/2007/PartnerControls"/>
+    <ds:schemaRef ds:uri="71af3243-3dd4-4a8d-8c0d-dd76da1f02a5"/>
   </ds:schemaRefs>
 </ds:datastoreItem>
 </file>
</xml_diff>